<commit_message>
Update 7 and 9
</commit_message>
<xml_diff>
--- a/content/3-cc310/07-searching-sorting/01-linear-slides.pptx
+++ b/content/3-cc310/07-searching-sorting/01-linear-slides.pptx
@@ -225,7 +225,7 @@
           <a:p>
             <a:fld id="{7965C686-E975-4851-995B-B3B455D4CBEA}" type="datetimeFigureOut">
               <a:rPr lang="en-US" smtClean="0"/>
-              <a:t>3/4/2020</a:t>
+              <a:t>3/20/2020</a:t>
             </a:fld>
             <a:endParaRPr lang="en-US"/>
           </a:p>
@@ -2291,7 +2291,7 @@
           <a:p>
             <a:fld id="{6B9CC98C-563E-4F7D-9927-73EC4AAC1618}" type="datetimeFigureOut">
               <a:rPr lang="en-US" smtClean="0"/>
-              <a:t>3/4/2020</a:t>
+              <a:t>3/20/2020</a:t>
             </a:fld>
             <a:endParaRPr lang="en-US"/>
           </a:p>
@@ -2489,7 +2489,7 @@
           <a:p>
             <a:fld id="{6B9CC98C-563E-4F7D-9927-73EC4AAC1618}" type="datetimeFigureOut">
               <a:rPr lang="en-US" smtClean="0"/>
-              <a:t>3/4/2020</a:t>
+              <a:t>3/20/2020</a:t>
             </a:fld>
             <a:endParaRPr lang="en-US"/>
           </a:p>
@@ -2697,7 +2697,7 @@
           <a:p>
             <a:fld id="{6B9CC98C-563E-4F7D-9927-73EC4AAC1618}" type="datetimeFigureOut">
               <a:rPr lang="en-US" smtClean="0"/>
-              <a:t>3/4/2020</a:t>
+              <a:t>3/20/2020</a:t>
             </a:fld>
             <a:endParaRPr lang="en-US"/>
           </a:p>
@@ -2895,7 +2895,7 @@
           <a:p>
             <a:fld id="{6B9CC98C-563E-4F7D-9927-73EC4AAC1618}" type="datetimeFigureOut">
               <a:rPr lang="en-US" smtClean="0"/>
-              <a:t>3/4/2020</a:t>
+              <a:t>3/20/2020</a:t>
             </a:fld>
             <a:endParaRPr lang="en-US"/>
           </a:p>
@@ -3170,7 +3170,7 @@
           <a:p>
             <a:fld id="{6B9CC98C-563E-4F7D-9927-73EC4AAC1618}" type="datetimeFigureOut">
               <a:rPr lang="en-US" smtClean="0"/>
-              <a:t>3/4/2020</a:t>
+              <a:t>3/20/2020</a:t>
             </a:fld>
             <a:endParaRPr lang="en-US"/>
           </a:p>
@@ -3435,7 +3435,7 @@
           <a:p>
             <a:fld id="{6B9CC98C-563E-4F7D-9927-73EC4AAC1618}" type="datetimeFigureOut">
               <a:rPr lang="en-US" smtClean="0"/>
-              <a:t>3/4/2020</a:t>
+              <a:t>3/20/2020</a:t>
             </a:fld>
             <a:endParaRPr lang="en-US"/>
           </a:p>
@@ -3847,7 +3847,7 @@
           <a:p>
             <a:fld id="{6B9CC98C-563E-4F7D-9927-73EC4AAC1618}" type="datetimeFigureOut">
               <a:rPr lang="en-US" smtClean="0"/>
-              <a:t>3/4/2020</a:t>
+              <a:t>3/20/2020</a:t>
             </a:fld>
             <a:endParaRPr lang="en-US"/>
           </a:p>
@@ -3988,7 +3988,7 @@
           <a:p>
             <a:fld id="{6B9CC98C-563E-4F7D-9927-73EC4AAC1618}" type="datetimeFigureOut">
               <a:rPr lang="en-US" smtClean="0"/>
-              <a:t>3/4/2020</a:t>
+              <a:t>3/20/2020</a:t>
             </a:fld>
             <a:endParaRPr lang="en-US"/>
           </a:p>
@@ -4101,7 +4101,7 @@
           <a:p>
             <a:fld id="{6B9CC98C-563E-4F7D-9927-73EC4AAC1618}" type="datetimeFigureOut">
               <a:rPr lang="en-US" smtClean="0"/>
-              <a:t>3/4/2020</a:t>
+              <a:t>3/20/2020</a:t>
             </a:fld>
             <a:endParaRPr lang="en-US"/>
           </a:p>
@@ -4412,7 +4412,7 @@
           <a:p>
             <a:fld id="{6B9CC98C-563E-4F7D-9927-73EC4AAC1618}" type="datetimeFigureOut">
               <a:rPr lang="en-US" smtClean="0"/>
-              <a:t>3/4/2020</a:t>
+              <a:t>3/20/2020</a:t>
             </a:fld>
             <a:endParaRPr lang="en-US"/>
           </a:p>
@@ -4704,7 +4704,7 @@
           <a:p>
             <a:fld id="{6B9CC98C-563E-4F7D-9927-73EC4AAC1618}" type="datetimeFigureOut">
               <a:rPr lang="en-US" smtClean="0"/>
-              <a:t>3/4/2020</a:t>
+              <a:t>3/20/2020</a:t>
             </a:fld>
             <a:endParaRPr lang="en-US"/>
           </a:p>
@@ -4950,7 +4950,7 @@
           <a:p>
             <a:fld id="{6B9CC98C-563E-4F7D-9927-73EC4AAC1618}" type="datetimeFigureOut">
               <a:rPr lang="en-US" smtClean="0"/>
-              <a:t>3/4/2020</a:t>
+              <a:t>3/20/2020</a:t>
             </a:fld>
             <a:endParaRPr lang="en-US"/>
           </a:p>
@@ -5353,6 +5353,14 @@
 <file path=ppt/slides/slide1.xml><?xml version="1.0" encoding="utf-8"?>
 <p:sld xmlns:a="http://schemas.openxmlformats.org/drawingml/2006/main" xmlns:r="http://schemas.openxmlformats.org/officeDocument/2006/relationships" xmlns:p="http://schemas.openxmlformats.org/presentationml/2006/main" show="0">
   <p:cSld>
+    <p:bg>
+      <p:bgPr>
+        <a:solidFill>
+          <a:srgbClr val="C0C0C0"/>
+        </a:solidFill>
+        <a:effectLst/>
+      </p:bgPr>
+    </p:bg>
     <p:spTree>
       <p:nvGrpSpPr>
         <p:cNvPr id="1" name=""/>
@@ -9253,18 +9261,18 @@
 </file>
 
 <file path=customXml/item1.xml><?xml version="1.0" encoding="utf-8"?>
+<p:properties xmlns:p="http://schemas.microsoft.com/office/2006/metadata/properties" xmlns:xsi="http://www.w3.org/2001/XMLSchema-instance" xmlns:pc="http://schemas.microsoft.com/office/infopath/2007/PartnerControls">
+  <documentManagement/>
+</p:properties>
+</file>
+
+<file path=customXml/item2.xml><?xml version="1.0" encoding="utf-8"?>
 <?mso-contentType ?>
 <FormTemplates xmlns="http://schemas.microsoft.com/sharepoint/v3/contenttype/forms">
   <Display>DocumentLibraryForm</Display>
   <Edit>DocumentLibraryForm</Edit>
   <New>DocumentLibraryForm</New>
 </FormTemplates>
-</file>
-
-<file path=customXml/item2.xml><?xml version="1.0" encoding="utf-8"?>
-<p:properties xmlns:p="http://schemas.microsoft.com/office/2006/metadata/properties" xmlns:xsi="http://www.w3.org/2001/XMLSchema-instance" xmlns:pc="http://schemas.microsoft.com/office/infopath/2007/PartnerControls">
-  <documentManagement/>
-</p:properties>
 </file>
 
 <file path=customXml/item3.xml><?xml version="1.0" encoding="utf-8"?>
@@ -9446,14 +9454,6 @@
 </file>
 
 <file path=customXml/itemProps1.xml><?xml version="1.0" encoding="utf-8"?>
-<ds:datastoreItem xmlns:ds="http://schemas.openxmlformats.org/officeDocument/2006/customXml" ds:itemID="{923228D6-D594-4907-8908-B39BE33AC58C}">
-  <ds:schemaRefs>
-    <ds:schemaRef ds:uri="http://schemas.microsoft.com/sharepoint/v3/contenttype/forms"/>
-  </ds:schemaRefs>
-</ds:datastoreItem>
-</file>
-
-<file path=customXml/itemProps2.xml><?xml version="1.0" encoding="utf-8"?>
 <ds:datastoreItem xmlns:ds="http://schemas.openxmlformats.org/officeDocument/2006/customXml" ds:itemID="{E36B5C00-A49D-4F91-89B2-E9D01A16B433}">
   <ds:schemaRefs>
     <ds:schemaRef ds:uri="http://purl.org/dc/elements/1.1/"/>
@@ -9465,6 +9465,14 @@
     <ds:schemaRef ds:uri="http://schemas.microsoft.com/office/2006/documentManagement/types"/>
     <ds:schemaRef ds:uri="http://schemas.microsoft.com/office/infopath/2007/PartnerControls"/>
     <ds:schemaRef ds:uri="http://www.w3.org/XML/1998/namespace"/>
+  </ds:schemaRefs>
+</ds:datastoreItem>
+</file>
+
+<file path=customXml/itemProps2.xml><?xml version="1.0" encoding="utf-8"?>
+<ds:datastoreItem xmlns:ds="http://schemas.openxmlformats.org/officeDocument/2006/customXml" ds:itemID="{923228D6-D594-4907-8908-B39BE33AC58C}">
+  <ds:schemaRefs>
+    <ds:schemaRef ds:uri="http://schemas.microsoft.com/sharepoint/v3/contenttype/forms"/>
   </ds:schemaRefs>
 </ds:datastoreItem>
 </file>

</xml_diff>